<commit_message>
numG c example added
</commit_message>
<xml_diff>
--- a/first time.pptx
+++ b/first time.pptx
@@ -3601,10 +3601,22 @@
           <a:lstStyle/>
           <a:p>
             <a:r>
-              <a:rPr lang="en-US" dirty="0"/>
+              <a:rPr lang="en-US" dirty="0">
+                <a:ln w="12700">
+                  <a:solidFill>
+                    <a:schemeClr val="bg1"/>
+                  </a:solidFill>
+                </a:ln>
+              </a:rPr>
               <a:t>And now its time for you to</a:t>
             </a:r>
-            <a:endParaRPr lang="de-DE" dirty="0"/>
+            <a:endParaRPr lang="de-DE" dirty="0">
+              <a:ln w="12700">
+                <a:solidFill>
+                  <a:schemeClr val="bg1"/>
+                </a:solidFill>
+              </a:ln>
+            </a:endParaRPr>
           </a:p>
         </p:txBody>
       </p:sp>
@@ -3738,7 +3750,7 @@
           <a:p>
             <a:r>
               <a:rPr lang="en-US" dirty="0"/>
-              <a:t>Stop the while loop with a special input</a:t>
+              <a:t>Stop the while loop with a special input, “let the user quit”</a:t>
             </a:r>
           </a:p>
           <a:p>
@@ -4266,7 +4278,7 @@
         </p:spPr>
         <p:txBody>
           <a:bodyPr>
-            <a:normAutofit fontScale="92500" lnSpcReduction="10000"/>
+            <a:normAutofit/>
           </a:bodyPr>
           <a:lstStyle/>
           <a:p>
@@ -4306,7 +4318,7 @@
             </a:pPr>
             <a:r>
               <a:rPr lang="en-US" dirty="0"/>
-              <a:t>We save last guess</a:t>
+              <a:t>Current range is lowest point to center point</a:t>
             </a:r>
           </a:p>
           <a:p>
@@ -4316,16 +4328,6 @@
             </a:pPr>
             <a:r>
               <a:rPr lang="en-US" dirty="0"/>
-              <a:t>Current range is lowest point to center point</a:t>
-            </a:r>
-          </a:p>
-          <a:p>
-            <a:pPr marL="971550" lvl="1" indent="-514350">
-              <a:buFont typeface="+mj-lt"/>
-              <a:buAutoNum type="arabicPeriod"/>
-            </a:pPr>
-            <a:r>
-              <a:rPr lang="en-US" dirty="0"/>
               <a:t>Start from the top</a:t>
             </a:r>
             <a:endParaRPr lang="de-DE" dirty="0"/>
@@ -4337,17 +4339,7 @@
             </a:pPr>
             <a:r>
               <a:rPr lang="de-DE" dirty="0"/>
-              <a:t>We are too low?</a:t>
-            </a:r>
-          </a:p>
-          <a:p>
-            <a:pPr marL="971550" lvl="1" indent="-514350">
-              <a:buFont typeface="+mj-lt"/>
-              <a:buAutoNum type="arabicPeriod"/>
-            </a:pPr>
-            <a:r>
-              <a:rPr lang="de-DE" dirty="0"/>
-              <a:t>We save last guess</a:t>
+              <a:t>We are too low? </a:t>
             </a:r>
           </a:p>
           <a:p>

</xml_diff>